<commit_message>
powerpoint decided to have changes?
</commit_message>
<xml_diff>
--- a/Dev_Tech.pptx
+++ b/Dev_Tech.pptx
@@ -6568,11 +6568,7 @@
             </a:r>
             <a:r>
               <a:rPr lang="en-US" dirty="0"/>
-              <a:t>, P. (2015). </a:t>
-            </a:r>
-            <a:r>
-              <a:rPr lang="en-US"/>
-              <a:t>Artificial intelligence: A modern approach.</a:t>
+              <a:t>, P. (2015). Artificial intelligence: A modern approach.</a:t>
             </a:r>
           </a:p>
         </p:txBody>

</xml_diff>